<commit_message>
Formal methods started, added to SA process.
</commit_message>
<xml_diff>
--- a/Thesis/images/vModel.pptx
+++ b/Thesis/images/vModel.pptx
@@ -105,6 +105,11 @@
       </a:defRPr>
     </a:lvl9pPr>
   </p:defaultTextStyle>
+  <p:extLst>
+    <p:ext uri="{EFAFB233-063F-42B5-8137-9DF3F51BA10A}">
+      <p15:sldGuideLst xmlns:p15="http://schemas.microsoft.com/office/powerpoint/2012/main"/>
+    </p:ext>
+  </p:extLst>
 </p:presentation>
 </file>
 
@@ -239,7 +244,7 @@
           <a:p>
             <a:fld id="{8473B377-76BD-4BC0-815A-EBDADF4860BD}" type="datetimeFigureOut">
               <a:rPr lang="en-US" smtClean="0"/>
-              <a:t>12/6/2019</a:t>
+              <a:t>12/9/2019</a:t>
             </a:fld>
             <a:endParaRPr lang="en-US"/>
           </a:p>
@@ -409,7 +414,7 @@
           <a:p>
             <a:fld id="{8473B377-76BD-4BC0-815A-EBDADF4860BD}" type="datetimeFigureOut">
               <a:rPr lang="en-US" smtClean="0"/>
-              <a:t>12/6/2019</a:t>
+              <a:t>12/9/2019</a:t>
             </a:fld>
             <a:endParaRPr lang="en-US"/>
           </a:p>
@@ -589,7 +594,7 @@
           <a:p>
             <a:fld id="{8473B377-76BD-4BC0-815A-EBDADF4860BD}" type="datetimeFigureOut">
               <a:rPr lang="en-US" smtClean="0"/>
-              <a:t>12/6/2019</a:t>
+              <a:t>12/9/2019</a:t>
             </a:fld>
             <a:endParaRPr lang="en-US"/>
           </a:p>
@@ -759,7 +764,7 @@
           <a:p>
             <a:fld id="{8473B377-76BD-4BC0-815A-EBDADF4860BD}" type="datetimeFigureOut">
               <a:rPr lang="en-US" smtClean="0"/>
-              <a:t>12/6/2019</a:t>
+              <a:t>12/9/2019</a:t>
             </a:fld>
             <a:endParaRPr lang="en-US"/>
           </a:p>
@@ -1005,7 +1010,7 @@
           <a:p>
             <a:fld id="{8473B377-76BD-4BC0-815A-EBDADF4860BD}" type="datetimeFigureOut">
               <a:rPr lang="en-US" smtClean="0"/>
-              <a:t>12/6/2019</a:t>
+              <a:t>12/9/2019</a:t>
             </a:fld>
             <a:endParaRPr lang="en-US"/>
           </a:p>
@@ -1237,7 +1242,7 @@
           <a:p>
             <a:fld id="{8473B377-76BD-4BC0-815A-EBDADF4860BD}" type="datetimeFigureOut">
               <a:rPr lang="en-US" smtClean="0"/>
-              <a:t>12/6/2019</a:t>
+              <a:t>12/9/2019</a:t>
             </a:fld>
             <a:endParaRPr lang="en-US"/>
           </a:p>
@@ -1604,7 +1609,7 @@
           <a:p>
             <a:fld id="{8473B377-76BD-4BC0-815A-EBDADF4860BD}" type="datetimeFigureOut">
               <a:rPr lang="en-US" smtClean="0"/>
-              <a:t>12/6/2019</a:t>
+              <a:t>12/9/2019</a:t>
             </a:fld>
             <a:endParaRPr lang="en-US"/>
           </a:p>
@@ -1722,7 +1727,7 @@
           <a:p>
             <a:fld id="{8473B377-76BD-4BC0-815A-EBDADF4860BD}" type="datetimeFigureOut">
               <a:rPr lang="en-US" smtClean="0"/>
-              <a:t>12/6/2019</a:t>
+              <a:t>12/9/2019</a:t>
             </a:fld>
             <a:endParaRPr lang="en-US"/>
           </a:p>
@@ -1817,7 +1822,7 @@
           <a:p>
             <a:fld id="{8473B377-76BD-4BC0-815A-EBDADF4860BD}" type="datetimeFigureOut">
               <a:rPr lang="en-US" smtClean="0"/>
-              <a:t>12/6/2019</a:t>
+              <a:t>12/9/2019</a:t>
             </a:fld>
             <a:endParaRPr lang="en-US"/>
           </a:p>
@@ -2094,7 +2099,7 @@
           <a:p>
             <a:fld id="{8473B377-76BD-4BC0-815A-EBDADF4860BD}" type="datetimeFigureOut">
               <a:rPr lang="en-US" smtClean="0"/>
-              <a:t>12/6/2019</a:t>
+              <a:t>12/9/2019</a:t>
             </a:fld>
             <a:endParaRPr lang="en-US"/>
           </a:p>
@@ -2347,7 +2352,7 @@
           <a:p>
             <a:fld id="{8473B377-76BD-4BC0-815A-EBDADF4860BD}" type="datetimeFigureOut">
               <a:rPr lang="en-US" smtClean="0"/>
-              <a:t>12/6/2019</a:t>
+              <a:t>12/9/2019</a:t>
             </a:fld>
             <a:endParaRPr lang="en-US"/>
           </a:p>
@@ -2560,7 +2565,7 @@
           <a:p>
             <a:fld id="{8473B377-76BD-4BC0-815A-EBDADF4860BD}" type="datetimeFigureOut">
               <a:rPr lang="en-US" smtClean="0"/>
-              <a:t>12/6/2019</a:t>
+              <a:t>12/9/2019</a:t>
             </a:fld>
             <a:endParaRPr lang="en-US"/>
           </a:p>
@@ -4003,7 +4008,7 @@
             <a:pPr algn="ctr"/>
             <a:r>
               <a:rPr lang="en-US" dirty="0" smtClean="0"/>
-              <a:t>Preliminary Module Safety Assessment</a:t>
+              <a:t>System FTA, CMA</a:t>
             </a:r>
             <a:endParaRPr lang="en-US" dirty="0"/>
           </a:p>
@@ -4050,9 +4055,22 @@
             <a:pPr algn="ctr"/>
             <a:r>
               <a:rPr lang="en-US" dirty="0" smtClean="0"/>
-              <a:t>Preliminary System Safety Assessment</a:t>
-            </a:r>
-            <a:endParaRPr lang="en-US" dirty="0"/>
+              <a:t>System FHA</a:t>
+            </a:r>
+          </a:p>
+          <a:p>
+            <a:pPr algn="ctr"/>
+            <a:r>
+              <a:rPr lang="en-US" dirty="0" smtClean="0"/>
+              <a:t>CCA</a:t>
+            </a:r>
+          </a:p>
+          <a:p>
+            <a:pPr algn="ctr"/>
+            <a:r>
+              <a:rPr lang="en-US" dirty="0" smtClean="0"/>
+              <a:t>PSSA</a:t>
+            </a:r>
           </a:p>
         </p:txBody>
       </p:sp>
@@ -4096,10 +4114,29 @@
           <a:p>
             <a:pPr algn="ctr"/>
             <a:r>
+              <a:rPr lang="en-US" dirty="0"/>
+              <a:t>Aircraft </a:t>
+            </a:r>
+            <a:r>
               <a:rPr lang="en-US" dirty="0" smtClean="0"/>
-              <a:t>Functional Hazard Assessment</a:t>
-            </a:r>
-            <a:endParaRPr lang="en-US" dirty="0"/>
+              <a:t>FHA</a:t>
+            </a:r>
+          </a:p>
+          <a:p>
+            <a:pPr algn="ctr"/>
+            <a:r>
+              <a:rPr lang="en-US" dirty="0" smtClean="0"/>
+              <a:t>CCA</a:t>
+            </a:r>
+            <a:endParaRPr lang="en-US" dirty="0" smtClean="0"/>
+          </a:p>
+          <a:p>
+            <a:pPr algn="ctr"/>
+            <a:r>
+              <a:rPr lang="en-US" dirty="0" smtClean="0"/>
+              <a:t>PASA</a:t>
+            </a:r>
+            <a:endParaRPr lang="en-US" dirty="0" smtClean="0"/>
           </a:p>
         </p:txBody>
       </p:sp>
@@ -4144,7 +4181,7 @@
             <a:pPr algn="ctr"/>
             <a:r>
               <a:rPr lang="en-US" dirty="0" smtClean="0"/>
-              <a:t>Safety Certification</a:t>
+              <a:t>Aircraft CCA, ASA</a:t>
             </a:r>
             <a:endParaRPr lang="en-US" dirty="0"/>
           </a:p>
@@ -4191,7 +4228,7 @@
             <a:pPr algn="ctr"/>
             <a:r>
               <a:rPr lang="en-US" dirty="0" smtClean="0"/>
-              <a:t>System Safety Assessment</a:t>
+              <a:t>System SSA, CCA, FMEA</a:t>
             </a:r>
             <a:endParaRPr lang="en-US" dirty="0"/>
           </a:p>
@@ -4238,7 +4275,7 @@
             <a:pPr algn="ctr"/>
             <a:r>
               <a:rPr lang="en-US" dirty="0" smtClean="0"/>
-              <a:t>Module Safety Assessment</a:t>
+              <a:t>System FTA, CMA, FMEA</a:t>
             </a:r>
             <a:endParaRPr lang="en-US" dirty="0"/>
           </a:p>

</xml_diff>